<commit_message>
Add documentation on set command in developer guide.
</commit_message>
<xml_diff>
--- a/docs/diagrams/LogicComponentClassDiagram.pptx
+++ b/docs/diagrams/LogicComponentClassDiagram.pptx
@@ -126,10 +126,6 @@
 </p:presentation>
 </file>
 
-<file path=ppt/revisionInfo.xml><?xml version="1.0" encoding="utf-8"?>
-<p1510:revInfo xmlns:a="http://schemas.openxmlformats.org/drawingml/2006/main" xmlns:r="http://schemas.openxmlformats.org/officeDocument/2006/relationships" xmlns:p1510="http://schemas.microsoft.com/office/powerpoint/2015/10/main"/>
-</file>
-
 <file path=ppt/notesMasters/notesMaster1.xml><?xml version="1.0" encoding="utf-8"?>
 <p:notesMaster xmlns:a="http://schemas.openxmlformats.org/drawingml/2006/main" xmlns:r="http://schemas.openxmlformats.org/officeDocument/2006/relationships" xmlns:p="http://schemas.openxmlformats.org/presentationml/2006/main">
   <p:cSld>
@@ -212,7 +208,7 @@
           <a:p>
             <a:fld id="{F5CC4B3F-88C1-4FFA-B1B6-F41C21DC6924}" type="datetimeFigureOut">
               <a:rPr lang="en-US" smtClean="0"/>
-              <a:t>7/20/17</a:t>
+              <a:t>3/20/2018</a:t>
             </a:fld>
             <a:endParaRPr lang="en-US"/>
           </a:p>
@@ -658,7 +654,7 @@
           <a:p>
             <a:fld id="{78C97017-6FC3-485B-9764-EAC9E56C1D49}" type="datetimeFigureOut">
               <a:rPr lang="en-US" smtClean="0"/>
-              <a:t>7/20/17</a:t>
+              <a:t>3/20/2018</a:t>
             </a:fld>
             <a:endParaRPr lang="en-US"/>
           </a:p>
@@ -826,7 +822,7 @@
           <a:p>
             <a:fld id="{78C97017-6FC3-485B-9764-EAC9E56C1D49}" type="datetimeFigureOut">
               <a:rPr lang="en-US" smtClean="0"/>
-              <a:t>7/20/17</a:t>
+              <a:t>3/20/2018</a:t>
             </a:fld>
             <a:endParaRPr lang="en-US"/>
           </a:p>
@@ -1004,7 +1000,7 @@
           <a:p>
             <a:fld id="{78C97017-6FC3-485B-9764-EAC9E56C1D49}" type="datetimeFigureOut">
               <a:rPr lang="en-US" smtClean="0"/>
-              <a:t>7/20/17</a:t>
+              <a:t>3/20/2018</a:t>
             </a:fld>
             <a:endParaRPr lang="en-US"/>
           </a:p>
@@ -1172,7 +1168,7 @@
           <a:p>
             <a:fld id="{78C97017-6FC3-485B-9764-EAC9E56C1D49}" type="datetimeFigureOut">
               <a:rPr lang="en-US" smtClean="0"/>
-              <a:t>7/20/17</a:t>
+              <a:t>3/20/2018</a:t>
             </a:fld>
             <a:endParaRPr lang="en-US"/>
           </a:p>
@@ -1417,7 +1413,7 @@
           <a:p>
             <a:fld id="{78C97017-6FC3-485B-9764-EAC9E56C1D49}" type="datetimeFigureOut">
               <a:rPr lang="en-US" smtClean="0"/>
-              <a:t>7/20/17</a:t>
+              <a:t>3/20/2018</a:t>
             </a:fld>
             <a:endParaRPr lang="en-US"/>
           </a:p>
@@ -1702,7 +1698,7 @@
           <a:p>
             <a:fld id="{78C97017-6FC3-485B-9764-EAC9E56C1D49}" type="datetimeFigureOut">
               <a:rPr lang="en-US" smtClean="0"/>
-              <a:t>7/20/17</a:t>
+              <a:t>3/20/2018</a:t>
             </a:fld>
             <a:endParaRPr lang="en-US"/>
           </a:p>
@@ -2121,7 +2117,7 @@
           <a:p>
             <a:fld id="{78C97017-6FC3-485B-9764-EAC9E56C1D49}" type="datetimeFigureOut">
               <a:rPr lang="en-US" smtClean="0"/>
-              <a:t>7/20/17</a:t>
+              <a:t>3/20/2018</a:t>
             </a:fld>
             <a:endParaRPr lang="en-US"/>
           </a:p>
@@ -2238,7 +2234,7 @@
           <a:p>
             <a:fld id="{78C97017-6FC3-485B-9764-EAC9E56C1D49}" type="datetimeFigureOut">
               <a:rPr lang="en-US" smtClean="0"/>
-              <a:t>7/20/17</a:t>
+              <a:t>3/20/2018</a:t>
             </a:fld>
             <a:endParaRPr lang="en-US"/>
           </a:p>
@@ -2333,7 +2329,7 @@
           <a:p>
             <a:fld id="{78C97017-6FC3-485B-9764-EAC9E56C1D49}" type="datetimeFigureOut">
               <a:rPr lang="en-US" smtClean="0"/>
-              <a:t>7/20/17</a:t>
+              <a:t>3/20/2018</a:t>
             </a:fld>
             <a:endParaRPr lang="en-US"/>
           </a:p>
@@ -2608,7 +2604,7 @@
           <a:p>
             <a:fld id="{78C97017-6FC3-485B-9764-EAC9E56C1D49}" type="datetimeFigureOut">
               <a:rPr lang="en-US" smtClean="0"/>
-              <a:t>7/20/17</a:t>
+              <a:t>3/20/2018</a:t>
             </a:fld>
             <a:endParaRPr lang="en-US"/>
           </a:p>
@@ -2860,7 +2856,7 @@
           <a:p>
             <a:fld id="{78C97017-6FC3-485B-9764-EAC9E56C1D49}" type="datetimeFigureOut">
               <a:rPr lang="en-US" smtClean="0"/>
-              <a:t>7/20/17</a:t>
+              <a:t>3/20/2018</a:t>
             </a:fld>
             <a:endParaRPr lang="en-US"/>
           </a:p>
@@ -3071,7 +3067,7 @@
           <a:p>
             <a:fld id="{78C97017-6FC3-485B-9764-EAC9E56C1D49}" type="datetimeFigureOut">
               <a:rPr lang="en-US" smtClean="0"/>
-              <a:t>7/20/17</a:t>
+              <a:t>3/20/2018</a:t>
             </a:fld>
             <a:endParaRPr lang="en-US"/>
           </a:p>
@@ -3607,7 +3603,7 @@
           <a:p>
             <a:pPr algn="ctr"/>
             <a:r>
-              <a:rPr lang="en-US" sz="1050" b="1" dirty="0" err="1" smtClean="0">
+              <a:rPr lang="en-US" sz="1050" b="1" dirty="0" err="1">
                 <a:solidFill>
                   <a:srgbClr val="0070C0"/>
                 </a:solidFill>
@@ -3939,7 +3935,7 @@
           <a:p>
             <a:pPr algn="ctr"/>
             <a:r>
-              <a:rPr lang="en-US" sz="1050" dirty="0" err="1" smtClean="0">
+              <a:rPr lang="en-US" sz="1050" dirty="0" err="1">
                 <a:solidFill>
                   <a:schemeClr val="bg1"/>
                 </a:solidFill>
@@ -4264,6 +4260,7 @@
         <p:nvCxnSpPr>
           <p:cNvPr id="25" name="Elbow Connector 63"/>
           <p:cNvCxnSpPr>
+            <a:cxnSpLocks/>
             <a:endCxn id="12" idx="1"/>
           </p:cNvCxnSpPr>
           <p:nvPr/>
@@ -5517,7 +5514,7 @@
           <p:cNvPr id="97" name="Rectangle 96">
             <a:extLst>
               <a:ext uri="{FF2B5EF4-FFF2-40B4-BE49-F238E27FC236}">
-                <a16:creationId xmlns="" xmlns:a16="http://schemas.microsoft.com/office/drawing/2014/main" id="{AADE6A0C-89AB-467B-8CEA-5FCF36CE0D21}"/>
+                <a16:creationId xmlns:a16="http://schemas.microsoft.com/office/drawing/2014/main" id="{AADE6A0C-89AB-467B-8CEA-5FCF36CE0D21}"/>
               </a:ext>
             </a:extLst>
           </p:cNvPr>
@@ -5815,7 +5812,7 @@
           <a:p>
             <a:pPr algn="ctr"/>
             <a:r>
-              <a:rPr lang="en-US" sz="1050" b="1" dirty="0" err="1" smtClean="0">
+              <a:rPr lang="en-US" sz="1050" b="1" dirty="0" err="1">
                 <a:solidFill>
                   <a:schemeClr val="bg1"/>
                 </a:solidFill>
@@ -6165,7 +6162,7 @@
           <a:p>
             <a:pPr algn="ctr"/>
             <a:r>
-              <a:rPr lang="en-US" sz="1050" dirty="0" err="1" smtClean="0">
+              <a:rPr lang="en-US" sz="1050" dirty="0" err="1">
                 <a:solidFill>
                   <a:schemeClr val="bg1"/>
                 </a:solidFill>
@@ -6173,7 +6170,7 @@
               <a:t>XYZCommand</a:t>
             </a:r>
             <a:r>
-              <a:rPr lang="en-US" sz="1050" dirty="0" smtClean="0">
+              <a:rPr lang="en-US" sz="1050" dirty="0">
                 <a:solidFill>
                   <a:schemeClr val="bg1"/>
                 </a:solidFill>
@@ -6181,7 +6178,7 @@
               <a:t> = </a:t>
             </a:r>
             <a:r>
-              <a:rPr lang="en-US" sz="1050" dirty="0" err="1" smtClean="0">
+              <a:rPr lang="en-US" sz="1050" dirty="0" err="1">
                 <a:solidFill>
                   <a:schemeClr val="bg1"/>
                 </a:solidFill>
@@ -6189,7 +6186,7 @@
               <a:t>AddCommand</a:t>
             </a:r>
             <a:r>
-              <a:rPr lang="en-US" sz="1050" dirty="0" smtClean="0">
+              <a:rPr lang="en-US" sz="1050" dirty="0">
                 <a:solidFill>
                   <a:schemeClr val="bg1"/>
                 </a:solidFill>
@@ -6197,7 +6194,7 @@
               <a:t>, </a:t>
             </a:r>
             <a:r>
-              <a:rPr lang="en-US" sz="1050" dirty="0" err="1" smtClean="0">
+              <a:rPr lang="en-US" sz="1050" dirty="0" err="1">
                 <a:solidFill>
                   <a:schemeClr val="bg1"/>
                 </a:solidFill>
@@ -6205,18 +6202,13 @@
               <a:t>FindCommand</a:t>
             </a:r>
             <a:r>
-              <a:rPr lang="en-US" sz="1050" dirty="0" smtClean="0">
+              <a:rPr lang="en-US" sz="1050" dirty="0">
                 <a:solidFill>
                   <a:schemeClr val="bg1"/>
                 </a:solidFill>
               </a:rPr>
               <a:t>, etc.</a:t>
             </a:r>
-            <a:endParaRPr lang="en-US" sz="1050" dirty="0">
-              <a:solidFill>
-                <a:schemeClr val="bg1"/>
-              </a:solidFill>
-            </a:endParaRPr>
           </a:p>
         </p:txBody>
       </p:sp>
@@ -6264,14 +6256,14 @@
           <a:p>
             <a:pPr algn="ctr"/>
             <a:r>
-              <a:rPr lang="en-US" sz="1050" dirty="0" err="1" smtClean="0">
+              <a:rPr lang="en-US" sz="1050" dirty="0" err="1">
                 <a:solidFill>
                   <a:schemeClr val="bg1"/>
                 </a:solidFill>
               </a:rPr>
               <a:t>UndoRedo</a:t>
             </a:r>
-            <a:endParaRPr lang="en-US" sz="1050" dirty="0" smtClean="0">
+            <a:endParaRPr lang="en-US" sz="1050" dirty="0">
               <a:solidFill>
                 <a:schemeClr val="bg1"/>
               </a:solidFill>
@@ -6280,7 +6272,7 @@
           <a:p>
             <a:pPr algn="ctr"/>
             <a:r>
-              <a:rPr lang="en-US" sz="1050" dirty="0" smtClean="0">
+              <a:rPr lang="en-US" sz="1050" dirty="0">
                 <a:solidFill>
                   <a:schemeClr val="bg1"/>
                 </a:solidFill>
@@ -6374,6 +6366,268 @@
           </a:p>
         </p:txBody>
       </p:sp>
+      <p:sp>
+        <p:nvSpPr>
+          <p:cNvPr id="64" name="Rectangle 62">
+            <a:extLst>
+              <a:ext uri="{FF2B5EF4-FFF2-40B4-BE49-F238E27FC236}">
+                <a16:creationId xmlns:a16="http://schemas.microsoft.com/office/drawing/2014/main" id="{9C1862CD-484E-45AA-B29A-33E2C2C6605E}"/>
+              </a:ext>
+            </a:extLst>
+          </p:cNvPr>
+          <p:cNvSpPr/>
+          <p:nvPr/>
+        </p:nvSpPr>
+        <p:spPr>
+          <a:xfrm>
+            <a:off x="3218221" y="4080780"/>
+            <a:ext cx="1116921" cy="376037"/>
+          </a:xfrm>
+          <a:prstGeom prst="rect">
+            <a:avLst/>
+          </a:prstGeom>
+          <a:solidFill>
+            <a:schemeClr val="accent5"/>
+          </a:solidFill>
+          <a:ln/>
+          <a:effectLst/>
+        </p:spPr>
+        <p:style>
+          <a:lnRef idx="1">
+            <a:schemeClr val="accent5"/>
+          </a:lnRef>
+          <a:fillRef idx="2">
+            <a:schemeClr val="accent5"/>
+          </a:fillRef>
+          <a:effectRef idx="1">
+            <a:schemeClr val="accent5"/>
+          </a:effectRef>
+          <a:fontRef idx="minor">
+            <a:schemeClr val="dk1"/>
+          </a:fontRef>
+        </p:style>
+        <p:txBody>
+          <a:bodyPr rtlCol="0" anchor="ctr"/>
+          <a:lstStyle/>
+          <a:p>
+            <a:pPr algn="ctr"/>
+            <a:r>
+              <a:rPr lang="en-US" sz="1050" dirty="0" err="1">
+                <a:solidFill>
+                  <a:schemeClr val="bg1"/>
+                </a:solidFill>
+              </a:rPr>
+              <a:t>CommandWords</a:t>
+            </a:r>
+            <a:endParaRPr lang="en-US" dirty="0" err="1"/>
+          </a:p>
+        </p:txBody>
+      </p:sp>
+      <p:cxnSp>
+        <p:nvCxnSpPr>
+          <p:cNvPr id="66" name="Elbow Connector 49">
+            <a:extLst>
+              <a:ext uri="{FF2B5EF4-FFF2-40B4-BE49-F238E27FC236}">
+                <a16:creationId xmlns:a16="http://schemas.microsoft.com/office/drawing/2014/main" id="{32F28D60-03B2-4618-8303-8682B5BD685A}"/>
+              </a:ext>
+            </a:extLst>
+          </p:cNvPr>
+          <p:cNvCxnSpPr>
+            <a:cxnSpLocks/>
+          </p:cNvCxnSpPr>
+          <p:nvPr/>
+        </p:nvCxnSpPr>
+        <p:spPr>
+          <a:xfrm rot="5400000">
+            <a:off x="3695034" y="4014900"/>
+            <a:ext cx="160576" cy="476"/>
+          </a:xfrm>
+          <a:prstGeom prst="bentConnector3">
+            <a:avLst>
+              <a:gd name="adj1" fmla="val 50000"/>
+            </a:avLst>
+          </a:prstGeom>
+          <a:ln w="19050">
+            <a:solidFill>
+              <a:schemeClr val="accent5">
+                <a:lumMod val="60000"/>
+                <a:lumOff val="40000"/>
+              </a:schemeClr>
+            </a:solidFill>
+            <a:prstDash val="sysDot"/>
+            <a:headEnd type="none" w="med" len="med"/>
+            <a:tailEnd type="arrow" w="med" len="med"/>
+          </a:ln>
+          <a:effectLst/>
+        </p:spPr>
+        <p:style>
+          <a:lnRef idx="1">
+            <a:schemeClr val="accent2"/>
+          </a:lnRef>
+          <a:fillRef idx="2">
+            <a:schemeClr val="accent2"/>
+          </a:fillRef>
+          <a:effectRef idx="1">
+            <a:schemeClr val="accent2"/>
+          </a:effectRef>
+          <a:fontRef idx="minor">
+            <a:schemeClr val="dk1"/>
+          </a:fontRef>
+        </p:style>
+      </p:cxnSp>
+      <p:sp>
+        <p:nvSpPr>
+          <p:cNvPr id="67" name="Rectangle 62">
+            <a:extLst>
+              <a:ext uri="{FF2B5EF4-FFF2-40B4-BE49-F238E27FC236}">
+                <a16:creationId xmlns:a16="http://schemas.microsoft.com/office/drawing/2014/main" id="{531CE4CC-127B-4A74-8CD4-F01D41584550}"/>
+              </a:ext>
+            </a:extLst>
+          </p:cNvPr>
+          <p:cNvSpPr/>
+          <p:nvPr/>
+        </p:nvSpPr>
+        <p:spPr>
+          <a:xfrm>
+            <a:off x="3228365" y="5267420"/>
+            <a:ext cx="1093635" cy="346760"/>
+          </a:xfrm>
+          <a:prstGeom prst="rect">
+            <a:avLst/>
+          </a:prstGeom>
+          <a:solidFill>
+            <a:srgbClr val="0070C0"/>
+          </a:solidFill>
+          <a:ln w="19050">
+            <a:solidFill>
+              <a:srgbClr val="0070C0"/>
+            </a:solidFill>
+          </a:ln>
+          <a:effectLst/>
+        </p:spPr>
+        <p:style>
+          <a:lnRef idx="1">
+            <a:schemeClr val="accent2"/>
+          </a:lnRef>
+          <a:fillRef idx="2">
+            <a:schemeClr val="accent2"/>
+          </a:fillRef>
+          <a:effectRef idx="1">
+            <a:schemeClr val="accent2"/>
+          </a:effectRef>
+          <a:fontRef idx="minor">
+            <a:schemeClr val="dk1"/>
+          </a:fontRef>
+        </p:style>
+        <p:txBody>
+          <a:bodyPr rtlCol="0" anchor="ctr"/>
+          <a:lstStyle/>
+          <a:p>
+            <a:pPr algn="ctr"/>
+            <a:r>
+              <a:rPr lang="en-US" sz="1050" dirty="0" err="1">
+                <a:solidFill>
+                  <a:schemeClr val="bg1"/>
+                </a:solidFill>
+              </a:rPr>
+              <a:t>UserPrefs</a:t>
+            </a:r>
+            <a:endParaRPr lang="en-US" dirty="0" err="1"/>
+          </a:p>
+        </p:txBody>
+      </p:sp>
+      <p:cxnSp>
+        <p:nvCxnSpPr>
+          <p:cNvPr id="71" name="Straight Arrow Connector 57">
+            <a:extLst>
+              <a:ext uri="{FF2B5EF4-FFF2-40B4-BE49-F238E27FC236}">
+                <a16:creationId xmlns:a16="http://schemas.microsoft.com/office/drawing/2014/main" id="{93D9ED93-2921-42FE-9FEF-DD67817C5843}"/>
+              </a:ext>
+            </a:extLst>
+          </p:cNvPr>
+          <p:cNvCxnSpPr>
+            <a:cxnSpLocks/>
+          </p:cNvCxnSpPr>
+          <p:nvPr/>
+        </p:nvCxnSpPr>
+        <p:spPr>
+          <a:xfrm flipV="1">
+            <a:off x="3773238" y="4454734"/>
+            <a:ext cx="6338" cy="813984"/>
+          </a:xfrm>
+          <a:prstGeom prst="straightConnector1">
+            <a:avLst/>
+          </a:prstGeom>
+          <a:ln w="19050">
+            <a:solidFill>
+              <a:srgbClr val="0070C0"/>
+            </a:solidFill>
+            <a:headEnd type="none" w="med" len="med"/>
+            <a:tailEnd type="arrow" w="med" len="med"/>
+          </a:ln>
+          <a:effectLst/>
+        </p:spPr>
+        <p:style>
+          <a:lnRef idx="1">
+            <a:schemeClr val="accent2"/>
+          </a:lnRef>
+          <a:fillRef idx="2">
+            <a:schemeClr val="accent2"/>
+          </a:fillRef>
+          <a:effectRef idx="1">
+            <a:schemeClr val="accent2"/>
+          </a:effectRef>
+          <a:fontRef idx="minor">
+            <a:schemeClr val="dk1"/>
+          </a:fontRef>
+        </p:style>
+      </p:cxnSp>
+      <p:cxnSp>
+        <p:nvCxnSpPr>
+          <p:cNvPr id="72" name="Straight Arrow Connector 57">
+            <a:extLst>
+              <a:ext uri="{FF2B5EF4-FFF2-40B4-BE49-F238E27FC236}">
+                <a16:creationId xmlns:a16="http://schemas.microsoft.com/office/drawing/2014/main" id="{4F4DA8ED-25F0-47FE-B4E6-E308EEF08B6B}"/>
+              </a:ext>
+            </a:extLst>
+          </p:cNvPr>
+          <p:cNvCxnSpPr>
+            <a:cxnSpLocks/>
+          </p:cNvCxnSpPr>
+          <p:nvPr/>
+        </p:nvCxnSpPr>
+        <p:spPr>
+          <a:xfrm flipH="1">
+            <a:off x="3547686" y="5101386"/>
+            <a:ext cx="1892" cy="176859"/>
+          </a:xfrm>
+          <a:prstGeom prst="straightConnector1">
+            <a:avLst/>
+          </a:prstGeom>
+          <a:ln w="19050">
+            <a:solidFill>
+              <a:srgbClr val="0070C0"/>
+            </a:solidFill>
+            <a:headEnd type="none" w="med" len="med"/>
+            <a:tailEnd type="arrow" w="med" len="med"/>
+          </a:ln>
+          <a:effectLst/>
+        </p:spPr>
+        <p:style>
+          <a:lnRef idx="1">
+            <a:schemeClr val="accent2"/>
+          </a:lnRef>
+          <a:fillRef idx="2">
+            <a:schemeClr val="accent2"/>
+          </a:fillRef>
+          <a:effectRef idx="1">
+            <a:schemeClr val="accent2"/>
+          </a:effectRef>
+          <a:fontRef idx="minor">
+            <a:schemeClr val="dk1"/>
+          </a:fontRef>
+        </p:style>
+      </p:cxnSp>
     </p:spTree>
     <p:extLst>
       <p:ext uri="{BB962C8B-B14F-4D97-AF65-F5344CB8AC3E}">

</xml_diff>

<commit_message>
V1.2 feature doc2 (#64)
* Add test case for SetCommandParser

* minor edits

* some edits

* Some minor edits based on the helpful suggestion of eugenepeh. Added features into developer guide.

* minor edit

* minor edits

* minor edits

* Add set command functionality to keep set of custom command words on top of default command words. Include test cases.

* Update features:
* importexport
* set

* Add documentation on set command in developer guide.

* minor edits
</commit_message>
<xml_diff>
--- a/docs/diagrams/LogicComponentClassDiagram.pptx
+++ b/docs/diagrams/LogicComponentClassDiagram.pptx
@@ -126,10 +126,6 @@
 </p:presentation>
 </file>
 
-<file path=ppt/revisionInfo.xml><?xml version="1.0" encoding="utf-8"?>
-<p1510:revInfo xmlns:a="http://schemas.openxmlformats.org/drawingml/2006/main" xmlns:r="http://schemas.openxmlformats.org/officeDocument/2006/relationships" xmlns:p1510="http://schemas.microsoft.com/office/powerpoint/2015/10/main"/>
-</file>
-
 <file path=ppt/notesMasters/notesMaster1.xml><?xml version="1.0" encoding="utf-8"?>
 <p:notesMaster xmlns:a="http://schemas.openxmlformats.org/drawingml/2006/main" xmlns:r="http://schemas.openxmlformats.org/officeDocument/2006/relationships" xmlns:p="http://schemas.openxmlformats.org/presentationml/2006/main">
   <p:cSld>
@@ -212,7 +208,7 @@
           <a:p>
             <a:fld id="{F5CC4B3F-88C1-4FFA-B1B6-F41C21DC6924}" type="datetimeFigureOut">
               <a:rPr lang="en-US" smtClean="0"/>
-              <a:t>7/20/17</a:t>
+              <a:t>3/20/2018</a:t>
             </a:fld>
             <a:endParaRPr lang="en-US"/>
           </a:p>
@@ -658,7 +654,7 @@
           <a:p>
             <a:fld id="{78C97017-6FC3-485B-9764-EAC9E56C1D49}" type="datetimeFigureOut">
               <a:rPr lang="en-US" smtClean="0"/>
-              <a:t>7/20/17</a:t>
+              <a:t>3/20/2018</a:t>
             </a:fld>
             <a:endParaRPr lang="en-US"/>
           </a:p>
@@ -826,7 +822,7 @@
           <a:p>
             <a:fld id="{78C97017-6FC3-485B-9764-EAC9E56C1D49}" type="datetimeFigureOut">
               <a:rPr lang="en-US" smtClean="0"/>
-              <a:t>7/20/17</a:t>
+              <a:t>3/20/2018</a:t>
             </a:fld>
             <a:endParaRPr lang="en-US"/>
           </a:p>
@@ -1004,7 +1000,7 @@
           <a:p>
             <a:fld id="{78C97017-6FC3-485B-9764-EAC9E56C1D49}" type="datetimeFigureOut">
               <a:rPr lang="en-US" smtClean="0"/>
-              <a:t>7/20/17</a:t>
+              <a:t>3/20/2018</a:t>
             </a:fld>
             <a:endParaRPr lang="en-US"/>
           </a:p>
@@ -1172,7 +1168,7 @@
           <a:p>
             <a:fld id="{78C97017-6FC3-485B-9764-EAC9E56C1D49}" type="datetimeFigureOut">
               <a:rPr lang="en-US" smtClean="0"/>
-              <a:t>7/20/17</a:t>
+              <a:t>3/20/2018</a:t>
             </a:fld>
             <a:endParaRPr lang="en-US"/>
           </a:p>
@@ -1417,7 +1413,7 @@
           <a:p>
             <a:fld id="{78C97017-6FC3-485B-9764-EAC9E56C1D49}" type="datetimeFigureOut">
               <a:rPr lang="en-US" smtClean="0"/>
-              <a:t>7/20/17</a:t>
+              <a:t>3/20/2018</a:t>
             </a:fld>
             <a:endParaRPr lang="en-US"/>
           </a:p>
@@ -1702,7 +1698,7 @@
           <a:p>
             <a:fld id="{78C97017-6FC3-485B-9764-EAC9E56C1D49}" type="datetimeFigureOut">
               <a:rPr lang="en-US" smtClean="0"/>
-              <a:t>7/20/17</a:t>
+              <a:t>3/20/2018</a:t>
             </a:fld>
             <a:endParaRPr lang="en-US"/>
           </a:p>
@@ -2121,7 +2117,7 @@
           <a:p>
             <a:fld id="{78C97017-6FC3-485B-9764-EAC9E56C1D49}" type="datetimeFigureOut">
               <a:rPr lang="en-US" smtClean="0"/>
-              <a:t>7/20/17</a:t>
+              <a:t>3/20/2018</a:t>
             </a:fld>
             <a:endParaRPr lang="en-US"/>
           </a:p>
@@ -2238,7 +2234,7 @@
           <a:p>
             <a:fld id="{78C97017-6FC3-485B-9764-EAC9E56C1D49}" type="datetimeFigureOut">
               <a:rPr lang="en-US" smtClean="0"/>
-              <a:t>7/20/17</a:t>
+              <a:t>3/20/2018</a:t>
             </a:fld>
             <a:endParaRPr lang="en-US"/>
           </a:p>
@@ -2333,7 +2329,7 @@
           <a:p>
             <a:fld id="{78C97017-6FC3-485B-9764-EAC9E56C1D49}" type="datetimeFigureOut">
               <a:rPr lang="en-US" smtClean="0"/>
-              <a:t>7/20/17</a:t>
+              <a:t>3/20/2018</a:t>
             </a:fld>
             <a:endParaRPr lang="en-US"/>
           </a:p>
@@ -2608,7 +2604,7 @@
           <a:p>
             <a:fld id="{78C97017-6FC3-485B-9764-EAC9E56C1D49}" type="datetimeFigureOut">
               <a:rPr lang="en-US" smtClean="0"/>
-              <a:t>7/20/17</a:t>
+              <a:t>3/20/2018</a:t>
             </a:fld>
             <a:endParaRPr lang="en-US"/>
           </a:p>
@@ -2860,7 +2856,7 @@
           <a:p>
             <a:fld id="{78C97017-6FC3-485B-9764-EAC9E56C1D49}" type="datetimeFigureOut">
               <a:rPr lang="en-US" smtClean="0"/>
-              <a:t>7/20/17</a:t>
+              <a:t>3/20/2018</a:t>
             </a:fld>
             <a:endParaRPr lang="en-US"/>
           </a:p>
@@ -3071,7 +3067,7 @@
           <a:p>
             <a:fld id="{78C97017-6FC3-485B-9764-EAC9E56C1D49}" type="datetimeFigureOut">
               <a:rPr lang="en-US" smtClean="0"/>
-              <a:t>7/20/17</a:t>
+              <a:t>3/20/2018</a:t>
             </a:fld>
             <a:endParaRPr lang="en-US"/>
           </a:p>
@@ -3607,7 +3603,7 @@
           <a:p>
             <a:pPr algn="ctr"/>
             <a:r>
-              <a:rPr lang="en-US" sz="1050" b="1" dirty="0" err="1" smtClean="0">
+              <a:rPr lang="en-US" sz="1050" b="1" dirty="0" err="1">
                 <a:solidFill>
                   <a:srgbClr val="0070C0"/>
                 </a:solidFill>
@@ -3939,7 +3935,7 @@
           <a:p>
             <a:pPr algn="ctr"/>
             <a:r>
-              <a:rPr lang="en-US" sz="1050" dirty="0" err="1" smtClean="0">
+              <a:rPr lang="en-US" sz="1050" dirty="0" err="1">
                 <a:solidFill>
                   <a:schemeClr val="bg1"/>
                 </a:solidFill>
@@ -4264,6 +4260,7 @@
         <p:nvCxnSpPr>
           <p:cNvPr id="25" name="Elbow Connector 63"/>
           <p:cNvCxnSpPr>
+            <a:cxnSpLocks/>
             <a:endCxn id="12" idx="1"/>
           </p:cNvCxnSpPr>
           <p:nvPr/>
@@ -5517,7 +5514,7 @@
           <p:cNvPr id="97" name="Rectangle 96">
             <a:extLst>
               <a:ext uri="{FF2B5EF4-FFF2-40B4-BE49-F238E27FC236}">
-                <a16:creationId xmlns="" xmlns:a16="http://schemas.microsoft.com/office/drawing/2014/main" id="{AADE6A0C-89AB-467B-8CEA-5FCF36CE0D21}"/>
+                <a16:creationId xmlns:a16="http://schemas.microsoft.com/office/drawing/2014/main" id="{AADE6A0C-89AB-467B-8CEA-5FCF36CE0D21}"/>
               </a:ext>
             </a:extLst>
           </p:cNvPr>
@@ -5815,7 +5812,7 @@
           <a:p>
             <a:pPr algn="ctr"/>
             <a:r>
-              <a:rPr lang="en-US" sz="1050" b="1" dirty="0" err="1" smtClean="0">
+              <a:rPr lang="en-US" sz="1050" b="1" dirty="0" err="1">
                 <a:solidFill>
                   <a:schemeClr val="bg1"/>
                 </a:solidFill>
@@ -6165,7 +6162,7 @@
           <a:p>
             <a:pPr algn="ctr"/>
             <a:r>
-              <a:rPr lang="en-US" sz="1050" dirty="0" err="1" smtClean="0">
+              <a:rPr lang="en-US" sz="1050" dirty="0" err="1">
                 <a:solidFill>
                   <a:schemeClr val="bg1"/>
                 </a:solidFill>
@@ -6173,7 +6170,7 @@
               <a:t>XYZCommand</a:t>
             </a:r>
             <a:r>
-              <a:rPr lang="en-US" sz="1050" dirty="0" smtClean="0">
+              <a:rPr lang="en-US" sz="1050" dirty="0">
                 <a:solidFill>
                   <a:schemeClr val="bg1"/>
                 </a:solidFill>
@@ -6181,7 +6178,7 @@
               <a:t> = </a:t>
             </a:r>
             <a:r>
-              <a:rPr lang="en-US" sz="1050" dirty="0" err="1" smtClean="0">
+              <a:rPr lang="en-US" sz="1050" dirty="0" err="1">
                 <a:solidFill>
                   <a:schemeClr val="bg1"/>
                 </a:solidFill>
@@ -6189,7 +6186,7 @@
               <a:t>AddCommand</a:t>
             </a:r>
             <a:r>
-              <a:rPr lang="en-US" sz="1050" dirty="0" smtClean="0">
+              <a:rPr lang="en-US" sz="1050" dirty="0">
                 <a:solidFill>
                   <a:schemeClr val="bg1"/>
                 </a:solidFill>
@@ -6197,7 +6194,7 @@
               <a:t>, </a:t>
             </a:r>
             <a:r>
-              <a:rPr lang="en-US" sz="1050" dirty="0" err="1" smtClean="0">
+              <a:rPr lang="en-US" sz="1050" dirty="0" err="1">
                 <a:solidFill>
                   <a:schemeClr val="bg1"/>
                 </a:solidFill>
@@ -6205,18 +6202,13 @@
               <a:t>FindCommand</a:t>
             </a:r>
             <a:r>
-              <a:rPr lang="en-US" sz="1050" dirty="0" smtClean="0">
+              <a:rPr lang="en-US" sz="1050" dirty="0">
                 <a:solidFill>
                   <a:schemeClr val="bg1"/>
                 </a:solidFill>
               </a:rPr>
               <a:t>, etc.</a:t>
             </a:r>
-            <a:endParaRPr lang="en-US" sz="1050" dirty="0">
-              <a:solidFill>
-                <a:schemeClr val="bg1"/>
-              </a:solidFill>
-            </a:endParaRPr>
           </a:p>
         </p:txBody>
       </p:sp>
@@ -6264,14 +6256,14 @@
           <a:p>
             <a:pPr algn="ctr"/>
             <a:r>
-              <a:rPr lang="en-US" sz="1050" dirty="0" err="1" smtClean="0">
+              <a:rPr lang="en-US" sz="1050" dirty="0" err="1">
                 <a:solidFill>
                   <a:schemeClr val="bg1"/>
                 </a:solidFill>
               </a:rPr>
               <a:t>UndoRedo</a:t>
             </a:r>
-            <a:endParaRPr lang="en-US" sz="1050" dirty="0" smtClean="0">
+            <a:endParaRPr lang="en-US" sz="1050" dirty="0">
               <a:solidFill>
                 <a:schemeClr val="bg1"/>
               </a:solidFill>
@@ -6280,7 +6272,7 @@
           <a:p>
             <a:pPr algn="ctr"/>
             <a:r>
-              <a:rPr lang="en-US" sz="1050" dirty="0" smtClean="0">
+              <a:rPr lang="en-US" sz="1050" dirty="0">
                 <a:solidFill>
                   <a:schemeClr val="bg1"/>
                 </a:solidFill>
@@ -6374,6 +6366,268 @@
           </a:p>
         </p:txBody>
       </p:sp>
+      <p:sp>
+        <p:nvSpPr>
+          <p:cNvPr id="64" name="Rectangle 62">
+            <a:extLst>
+              <a:ext uri="{FF2B5EF4-FFF2-40B4-BE49-F238E27FC236}">
+                <a16:creationId xmlns:a16="http://schemas.microsoft.com/office/drawing/2014/main" id="{9C1862CD-484E-45AA-B29A-33E2C2C6605E}"/>
+              </a:ext>
+            </a:extLst>
+          </p:cNvPr>
+          <p:cNvSpPr/>
+          <p:nvPr/>
+        </p:nvSpPr>
+        <p:spPr>
+          <a:xfrm>
+            <a:off x="3218221" y="4080780"/>
+            <a:ext cx="1116921" cy="376037"/>
+          </a:xfrm>
+          <a:prstGeom prst="rect">
+            <a:avLst/>
+          </a:prstGeom>
+          <a:solidFill>
+            <a:schemeClr val="accent5"/>
+          </a:solidFill>
+          <a:ln/>
+          <a:effectLst/>
+        </p:spPr>
+        <p:style>
+          <a:lnRef idx="1">
+            <a:schemeClr val="accent5"/>
+          </a:lnRef>
+          <a:fillRef idx="2">
+            <a:schemeClr val="accent5"/>
+          </a:fillRef>
+          <a:effectRef idx="1">
+            <a:schemeClr val="accent5"/>
+          </a:effectRef>
+          <a:fontRef idx="minor">
+            <a:schemeClr val="dk1"/>
+          </a:fontRef>
+        </p:style>
+        <p:txBody>
+          <a:bodyPr rtlCol="0" anchor="ctr"/>
+          <a:lstStyle/>
+          <a:p>
+            <a:pPr algn="ctr"/>
+            <a:r>
+              <a:rPr lang="en-US" sz="1050" dirty="0" err="1">
+                <a:solidFill>
+                  <a:schemeClr val="bg1"/>
+                </a:solidFill>
+              </a:rPr>
+              <a:t>CommandWords</a:t>
+            </a:r>
+            <a:endParaRPr lang="en-US" dirty="0" err="1"/>
+          </a:p>
+        </p:txBody>
+      </p:sp>
+      <p:cxnSp>
+        <p:nvCxnSpPr>
+          <p:cNvPr id="66" name="Elbow Connector 49">
+            <a:extLst>
+              <a:ext uri="{FF2B5EF4-FFF2-40B4-BE49-F238E27FC236}">
+                <a16:creationId xmlns:a16="http://schemas.microsoft.com/office/drawing/2014/main" id="{32F28D60-03B2-4618-8303-8682B5BD685A}"/>
+              </a:ext>
+            </a:extLst>
+          </p:cNvPr>
+          <p:cNvCxnSpPr>
+            <a:cxnSpLocks/>
+          </p:cNvCxnSpPr>
+          <p:nvPr/>
+        </p:nvCxnSpPr>
+        <p:spPr>
+          <a:xfrm rot="5400000">
+            <a:off x="3695034" y="4014900"/>
+            <a:ext cx="160576" cy="476"/>
+          </a:xfrm>
+          <a:prstGeom prst="bentConnector3">
+            <a:avLst>
+              <a:gd name="adj1" fmla="val 50000"/>
+            </a:avLst>
+          </a:prstGeom>
+          <a:ln w="19050">
+            <a:solidFill>
+              <a:schemeClr val="accent5">
+                <a:lumMod val="60000"/>
+                <a:lumOff val="40000"/>
+              </a:schemeClr>
+            </a:solidFill>
+            <a:prstDash val="sysDot"/>
+            <a:headEnd type="none" w="med" len="med"/>
+            <a:tailEnd type="arrow" w="med" len="med"/>
+          </a:ln>
+          <a:effectLst/>
+        </p:spPr>
+        <p:style>
+          <a:lnRef idx="1">
+            <a:schemeClr val="accent2"/>
+          </a:lnRef>
+          <a:fillRef idx="2">
+            <a:schemeClr val="accent2"/>
+          </a:fillRef>
+          <a:effectRef idx="1">
+            <a:schemeClr val="accent2"/>
+          </a:effectRef>
+          <a:fontRef idx="minor">
+            <a:schemeClr val="dk1"/>
+          </a:fontRef>
+        </p:style>
+      </p:cxnSp>
+      <p:sp>
+        <p:nvSpPr>
+          <p:cNvPr id="67" name="Rectangle 62">
+            <a:extLst>
+              <a:ext uri="{FF2B5EF4-FFF2-40B4-BE49-F238E27FC236}">
+                <a16:creationId xmlns:a16="http://schemas.microsoft.com/office/drawing/2014/main" id="{531CE4CC-127B-4A74-8CD4-F01D41584550}"/>
+              </a:ext>
+            </a:extLst>
+          </p:cNvPr>
+          <p:cNvSpPr/>
+          <p:nvPr/>
+        </p:nvSpPr>
+        <p:spPr>
+          <a:xfrm>
+            <a:off x="3228365" y="5267420"/>
+            <a:ext cx="1093635" cy="346760"/>
+          </a:xfrm>
+          <a:prstGeom prst="rect">
+            <a:avLst/>
+          </a:prstGeom>
+          <a:solidFill>
+            <a:srgbClr val="0070C0"/>
+          </a:solidFill>
+          <a:ln w="19050">
+            <a:solidFill>
+              <a:srgbClr val="0070C0"/>
+            </a:solidFill>
+          </a:ln>
+          <a:effectLst/>
+        </p:spPr>
+        <p:style>
+          <a:lnRef idx="1">
+            <a:schemeClr val="accent2"/>
+          </a:lnRef>
+          <a:fillRef idx="2">
+            <a:schemeClr val="accent2"/>
+          </a:fillRef>
+          <a:effectRef idx="1">
+            <a:schemeClr val="accent2"/>
+          </a:effectRef>
+          <a:fontRef idx="minor">
+            <a:schemeClr val="dk1"/>
+          </a:fontRef>
+        </p:style>
+        <p:txBody>
+          <a:bodyPr rtlCol="0" anchor="ctr"/>
+          <a:lstStyle/>
+          <a:p>
+            <a:pPr algn="ctr"/>
+            <a:r>
+              <a:rPr lang="en-US" sz="1050" dirty="0" err="1">
+                <a:solidFill>
+                  <a:schemeClr val="bg1"/>
+                </a:solidFill>
+              </a:rPr>
+              <a:t>UserPrefs</a:t>
+            </a:r>
+            <a:endParaRPr lang="en-US" dirty="0" err="1"/>
+          </a:p>
+        </p:txBody>
+      </p:sp>
+      <p:cxnSp>
+        <p:nvCxnSpPr>
+          <p:cNvPr id="71" name="Straight Arrow Connector 57">
+            <a:extLst>
+              <a:ext uri="{FF2B5EF4-FFF2-40B4-BE49-F238E27FC236}">
+                <a16:creationId xmlns:a16="http://schemas.microsoft.com/office/drawing/2014/main" id="{93D9ED93-2921-42FE-9FEF-DD67817C5843}"/>
+              </a:ext>
+            </a:extLst>
+          </p:cNvPr>
+          <p:cNvCxnSpPr>
+            <a:cxnSpLocks/>
+          </p:cNvCxnSpPr>
+          <p:nvPr/>
+        </p:nvCxnSpPr>
+        <p:spPr>
+          <a:xfrm flipV="1">
+            <a:off x="3773238" y="4454734"/>
+            <a:ext cx="6338" cy="813984"/>
+          </a:xfrm>
+          <a:prstGeom prst="straightConnector1">
+            <a:avLst/>
+          </a:prstGeom>
+          <a:ln w="19050">
+            <a:solidFill>
+              <a:srgbClr val="0070C0"/>
+            </a:solidFill>
+            <a:headEnd type="none" w="med" len="med"/>
+            <a:tailEnd type="arrow" w="med" len="med"/>
+          </a:ln>
+          <a:effectLst/>
+        </p:spPr>
+        <p:style>
+          <a:lnRef idx="1">
+            <a:schemeClr val="accent2"/>
+          </a:lnRef>
+          <a:fillRef idx="2">
+            <a:schemeClr val="accent2"/>
+          </a:fillRef>
+          <a:effectRef idx="1">
+            <a:schemeClr val="accent2"/>
+          </a:effectRef>
+          <a:fontRef idx="minor">
+            <a:schemeClr val="dk1"/>
+          </a:fontRef>
+        </p:style>
+      </p:cxnSp>
+      <p:cxnSp>
+        <p:nvCxnSpPr>
+          <p:cNvPr id="72" name="Straight Arrow Connector 57">
+            <a:extLst>
+              <a:ext uri="{FF2B5EF4-FFF2-40B4-BE49-F238E27FC236}">
+                <a16:creationId xmlns:a16="http://schemas.microsoft.com/office/drawing/2014/main" id="{4F4DA8ED-25F0-47FE-B4E6-E308EEF08B6B}"/>
+              </a:ext>
+            </a:extLst>
+          </p:cNvPr>
+          <p:cNvCxnSpPr>
+            <a:cxnSpLocks/>
+          </p:cNvCxnSpPr>
+          <p:nvPr/>
+        </p:nvCxnSpPr>
+        <p:spPr>
+          <a:xfrm flipH="1">
+            <a:off x="3547686" y="5101386"/>
+            <a:ext cx="1892" cy="176859"/>
+          </a:xfrm>
+          <a:prstGeom prst="straightConnector1">
+            <a:avLst/>
+          </a:prstGeom>
+          <a:ln w="19050">
+            <a:solidFill>
+              <a:srgbClr val="0070C0"/>
+            </a:solidFill>
+            <a:headEnd type="none" w="med" len="med"/>
+            <a:tailEnd type="arrow" w="med" len="med"/>
+          </a:ln>
+          <a:effectLst/>
+        </p:spPr>
+        <p:style>
+          <a:lnRef idx="1">
+            <a:schemeClr val="accent2"/>
+          </a:lnRef>
+          <a:fillRef idx="2">
+            <a:schemeClr val="accent2"/>
+          </a:fillRef>
+          <a:effectRef idx="1">
+            <a:schemeClr val="accent2"/>
+          </a:effectRef>
+          <a:fontRef idx="minor">
+            <a:schemeClr val="dk1"/>
+          </a:fontRef>
+        </p:style>
+      </p:cxnSp>
     </p:spTree>
     <p:extLst>
       <p:ext uri="{BB962C8B-B14F-4D97-AF65-F5344CB8AC3E}">

</xml_diff>